<commit_message>
se agrega presentacion corregida
</commit_message>
<xml_diff>
--- a/front/public/Documentacion/Trimestre_5/Presentacion Proyecto/Presentación del Proyecto Mystical cut final (1).pptx
+++ b/front/public/Documentacion/Trimestre_5/Presentacion Proyecto/Presentación del Proyecto Mystical cut final (1).pptx
@@ -6268,7 +6268,7 @@
               <a:rPr lang="es-CO" smtClean="0"/>
               <a:t>13</a:t>
             </a:fld>
-            <a:endParaRPr lang="es-CO"/>
+            <a:endParaRPr lang="es-CO" dirty="0"/>
           </a:p>
         </p:txBody>
       </p:sp>
@@ -6286,7 +6286,7 @@
         </p:nvSpPr>
         <p:spPr>
           <a:xfrm>
-            <a:off x="1398494" y="2565605"/>
+            <a:off x="1371600" y="1641193"/>
             <a:ext cx="4191000" cy="375552"/>
           </a:xfrm>
           <a:prstGeom prst="rect">
@@ -6337,7 +6337,7 @@
         </p:nvSpPr>
         <p:spPr>
           <a:xfrm>
-            <a:off x="7930259" y="2631446"/>
+            <a:off x="7930259" y="1707659"/>
             <a:ext cx="2286000" cy="369332"/>
           </a:xfrm>
           <a:prstGeom prst="rect">
@@ -6383,7 +6383,7 @@
         </p:nvSpPr>
         <p:spPr>
           <a:xfrm>
-            <a:off x="4572000" y="4419600"/>
+            <a:off x="4658161" y="4228714"/>
             <a:ext cx="2590800" cy="369332"/>
           </a:xfrm>
           <a:prstGeom prst="rect">
@@ -6412,6 +6412,200 @@
               <a:ea typeface="Calibri" panose="020F0502020204030204" pitchFamily="34" charset="0"/>
               <a:cs typeface="Times New Roman" panose="02020603050405020304" pitchFamily="18" charset="0"/>
             </a:endParaRPr>
+          </a:p>
+        </p:txBody>
+      </p:sp>
+      <p:pic>
+        <p:nvPicPr>
+          <p:cNvPr id="8" name="Imagen 7">
+            <a:hlinkClick r:id="rId6"/>
+            <a:extLst>
+              <a:ext uri="{FF2B5EF4-FFF2-40B4-BE49-F238E27FC236}">
+                <a16:creationId xmlns:a16="http://schemas.microsoft.com/office/drawing/2014/main" id="{6CD0ABD1-8BAB-6777-5134-79ED9A453AF5}"/>
+              </a:ext>
+            </a:extLst>
+          </p:cNvPr>
+          <p:cNvPicPr>
+            <a:picLocks noChangeAspect="1"/>
+          </p:cNvPicPr>
+          <p:nvPr/>
+        </p:nvPicPr>
+        <p:blipFill>
+          <a:blip r:embed="rId7"/>
+          <a:stretch>
+            <a:fillRect/>
+          </a:stretch>
+        </p:blipFill>
+        <p:spPr>
+          <a:xfrm>
+            <a:off x="1524000" y="2076991"/>
+            <a:ext cx="3200400" cy="1919078"/>
+          </a:xfrm>
+          <a:prstGeom prst="rect">
+            <a:avLst/>
+          </a:prstGeom>
+        </p:spPr>
+      </p:pic>
+      <p:pic>
+        <p:nvPicPr>
+          <p:cNvPr id="10" name="Imagen 9">
+            <a:hlinkClick r:id="rId8"/>
+            <a:extLst>
+              <a:ext uri="{FF2B5EF4-FFF2-40B4-BE49-F238E27FC236}">
+                <a16:creationId xmlns:a16="http://schemas.microsoft.com/office/drawing/2014/main" id="{83C750F6-D4F8-2810-D5CD-69BA5A816EB5}"/>
+              </a:ext>
+            </a:extLst>
+          </p:cNvPr>
+          <p:cNvPicPr>
+            <a:picLocks noChangeAspect="1"/>
+          </p:cNvPicPr>
+          <p:nvPr/>
+        </p:nvPicPr>
+        <p:blipFill>
+          <a:blip r:embed="rId9"/>
+          <a:stretch>
+            <a:fillRect/>
+          </a:stretch>
+        </p:blipFill>
+        <p:spPr>
+          <a:xfrm>
+            <a:off x="7251419" y="2083289"/>
+            <a:ext cx="3416581" cy="1802911"/>
+          </a:xfrm>
+          <a:prstGeom prst="rect">
+            <a:avLst/>
+          </a:prstGeom>
+        </p:spPr>
+      </p:pic>
+      <p:pic>
+        <p:nvPicPr>
+          <p:cNvPr id="12" name="Imagen 11">
+            <a:hlinkClick r:id="rId10"/>
+            <a:extLst>
+              <a:ext uri="{FF2B5EF4-FFF2-40B4-BE49-F238E27FC236}">
+                <a16:creationId xmlns:a16="http://schemas.microsoft.com/office/drawing/2014/main" id="{4507499F-3EC0-3394-9947-E2EE940D728C}"/>
+              </a:ext>
+            </a:extLst>
+          </p:cNvPr>
+          <p:cNvPicPr>
+            <a:picLocks noChangeAspect="1"/>
+          </p:cNvPicPr>
+          <p:nvPr/>
+        </p:nvPicPr>
+        <p:blipFill>
+          <a:blip r:embed="rId11"/>
+          <a:stretch>
+            <a:fillRect/>
+          </a:stretch>
+        </p:blipFill>
+        <p:spPr>
+          <a:xfrm>
+            <a:off x="3295797" y="4607563"/>
+            <a:ext cx="2590801" cy="1779894"/>
+          </a:xfrm>
+          <a:prstGeom prst="rect">
+            <a:avLst/>
+          </a:prstGeom>
+        </p:spPr>
+      </p:pic>
+      <p:pic>
+        <p:nvPicPr>
+          <p:cNvPr id="14" name="Imagen 13">
+            <a:hlinkClick r:id="rId12"/>
+            <a:extLst>
+              <a:ext uri="{FF2B5EF4-FFF2-40B4-BE49-F238E27FC236}">
+                <a16:creationId xmlns:a16="http://schemas.microsoft.com/office/drawing/2014/main" id="{71768069-DF49-1570-95CD-EFB5B8BF3DA1}"/>
+              </a:ext>
+            </a:extLst>
+          </p:cNvPr>
+          <p:cNvPicPr>
+            <a:picLocks noChangeAspect="1"/>
+          </p:cNvPicPr>
+          <p:nvPr/>
+        </p:nvPicPr>
+        <p:blipFill>
+          <a:blip r:embed="rId13"/>
+          <a:stretch>
+            <a:fillRect/>
+          </a:stretch>
+        </p:blipFill>
+        <p:spPr>
+          <a:xfrm>
+            <a:off x="6131963" y="4639518"/>
+            <a:ext cx="2400912" cy="1743271"/>
+          </a:xfrm>
+          <a:prstGeom prst="rect">
+            <a:avLst/>
+          </a:prstGeom>
+        </p:spPr>
+      </p:pic>
+      <p:sp>
+        <p:nvSpPr>
+          <p:cNvPr id="21" name="CuadroTexto 20">
+            <a:extLst>
+              <a:ext uri="{FF2B5EF4-FFF2-40B4-BE49-F238E27FC236}">
+                <a16:creationId xmlns:a16="http://schemas.microsoft.com/office/drawing/2014/main" id="{E49501B3-91CF-CBD6-9C01-771F538177E3}"/>
+              </a:ext>
+            </a:extLst>
+          </p:cNvPr>
+          <p:cNvSpPr txBox="1"/>
+          <p:nvPr/>
+        </p:nvSpPr>
+        <p:spPr>
+          <a:xfrm>
+            <a:off x="3408846" y="6435728"/>
+            <a:ext cx="2590800" cy="369332"/>
+          </a:xfrm>
+          <a:prstGeom prst="rect">
+            <a:avLst/>
+          </a:prstGeom>
+          <a:noFill/>
+        </p:spPr>
+        <p:txBody>
+          <a:bodyPr wrap="square" rtlCol="0">
+            <a:spAutoFit/>
+          </a:bodyPr>
+          <a:lstStyle/>
+          <a:p>
+            <a:r>
+              <a:rPr lang="es-CO" dirty="0"/>
+              <a:t>MODULO SERVICIOS</a:t>
+            </a:r>
+          </a:p>
+        </p:txBody>
+      </p:sp>
+      <p:sp>
+        <p:nvSpPr>
+          <p:cNvPr id="22" name="CuadroTexto 21">
+            <a:extLst>
+              <a:ext uri="{FF2B5EF4-FFF2-40B4-BE49-F238E27FC236}">
+                <a16:creationId xmlns:a16="http://schemas.microsoft.com/office/drawing/2014/main" id="{73BCBFD5-052E-7661-5838-44190C293169}"/>
+              </a:ext>
+            </a:extLst>
+          </p:cNvPr>
+          <p:cNvSpPr txBox="1"/>
+          <p:nvPr/>
+        </p:nvSpPr>
+        <p:spPr>
+          <a:xfrm>
+            <a:off x="6131963" y="6399747"/>
+            <a:ext cx="2590800" cy="369332"/>
+          </a:xfrm>
+          <a:prstGeom prst="rect">
+            <a:avLst/>
+          </a:prstGeom>
+          <a:noFill/>
+        </p:spPr>
+        <p:txBody>
+          <a:bodyPr wrap="square" rtlCol="0">
+            <a:spAutoFit/>
+          </a:bodyPr>
+          <a:lstStyle/>
+          <a:p>
+            <a:r>
+              <a:rPr lang="es-CO" dirty="0"/>
+              <a:t>MODULO USUARIOS</a:t>
+            </a:r>
           </a:p>
         </p:txBody>
       </p:sp>
@@ -6459,7 +6653,7 @@
         </p:blipFill>
         <p:spPr>
           <a:xfrm>
-            <a:off x="-8965" y="-27654"/>
+            <a:off x="-9832" y="-81870"/>
             <a:ext cx="12192000" cy="6857999"/>
           </a:xfrm>
           <a:prstGeom prst="rect">
@@ -6768,54 +6962,6 @@
       </p:sp>
       <p:sp>
         <p:nvSpPr>
-          <p:cNvPr id="2" name="CuadroTexto 1">
-            <a:extLst>
-              <a:ext uri="{FF2B5EF4-FFF2-40B4-BE49-F238E27FC236}">
-                <a16:creationId xmlns:a16="http://schemas.microsoft.com/office/drawing/2014/main" id="{7BE8A922-697E-68B9-B55C-B5778806A121}"/>
-              </a:ext>
-            </a:extLst>
-          </p:cNvPr>
-          <p:cNvSpPr txBox="1"/>
-          <p:nvPr/>
-        </p:nvSpPr>
-        <p:spPr>
-          <a:xfrm>
-            <a:off x="1398494" y="2565605"/>
-            <a:ext cx="4191000" cy="375552"/>
-          </a:xfrm>
-          <a:prstGeom prst="rect">
-            <a:avLst/>
-          </a:prstGeom>
-          <a:noFill/>
-        </p:spPr>
-        <p:txBody>
-          <a:bodyPr wrap="square" rtlCol="0">
-            <a:spAutoFit/>
-          </a:bodyPr>
-          <a:lstStyle/>
-          <a:p>
-            <a:pPr marL="457200" lvl="1">
-              <a:lnSpc>
-                <a:spcPct val="107000"/>
-              </a:lnSpc>
-              <a:spcAft>
-                <a:spcPts val="800"/>
-              </a:spcAft>
-            </a:pPr>
-            <a:r>
-              <a:rPr lang="es-CO" sz="1800" kern="100" dirty="0">
-                <a:effectLst/>
-                <a:latin typeface="Calibri" panose="020F0502020204030204" pitchFamily="34" charset="0"/>
-                <a:ea typeface="Calibri" panose="020F0502020204030204" pitchFamily="34" charset="0"/>
-                <a:cs typeface="Times New Roman" panose="02020603050405020304" pitchFamily="18" charset="0"/>
-              </a:rPr>
-              <a:t>Plan de instalación</a:t>
-            </a:r>
-          </a:p>
-        </p:txBody>
-      </p:sp>
-      <p:sp>
-        <p:nvSpPr>
           <p:cNvPr id="6" name="CuadroTexto 5">
             <a:extLst>
               <a:ext uri="{FF2B5EF4-FFF2-40B4-BE49-F238E27FC236}">
@@ -6828,7 +6974,7 @@
         </p:nvSpPr>
         <p:spPr>
           <a:xfrm>
-            <a:off x="7930259" y="2631446"/>
+            <a:off x="6858000" y="2800406"/>
             <a:ext cx="2286000" cy="375552"/>
           </a:xfrm>
           <a:prstGeom prst="rect">
@@ -6876,7 +7022,7 @@
         </p:nvSpPr>
         <p:spPr>
           <a:xfrm>
-            <a:off x="4132679" y="4425405"/>
+            <a:off x="1828800" y="2780648"/>
             <a:ext cx="3797580" cy="375552"/>
           </a:xfrm>
           <a:prstGeom prst="rect">
@@ -6910,6 +7056,68 @@
           </a:p>
         </p:txBody>
       </p:sp>
+      <p:pic>
+        <p:nvPicPr>
+          <p:cNvPr id="10" name="Imagen 9">
+            <a:hlinkClick r:id="rId6"/>
+            <a:extLst>
+              <a:ext uri="{FF2B5EF4-FFF2-40B4-BE49-F238E27FC236}">
+                <a16:creationId xmlns:a16="http://schemas.microsoft.com/office/drawing/2014/main" id="{88ECAA62-5EF3-5FBB-3001-43AA28FEB6CC}"/>
+              </a:ext>
+            </a:extLst>
+          </p:cNvPr>
+          <p:cNvPicPr>
+            <a:picLocks noChangeAspect="1"/>
+          </p:cNvPicPr>
+          <p:nvPr/>
+        </p:nvPicPr>
+        <p:blipFill>
+          <a:blip r:embed="rId7"/>
+          <a:stretch>
+            <a:fillRect/>
+          </a:stretch>
+        </p:blipFill>
+        <p:spPr>
+          <a:xfrm>
+            <a:off x="3124200" y="3392129"/>
+            <a:ext cx="1795681" cy="2063123"/>
+          </a:xfrm>
+          <a:prstGeom prst="rect">
+            <a:avLst/>
+          </a:prstGeom>
+        </p:spPr>
+      </p:pic>
+      <p:pic>
+        <p:nvPicPr>
+          <p:cNvPr id="12" name="Imagen 11">
+            <a:hlinkClick r:id="rId8"/>
+            <a:extLst>
+              <a:ext uri="{FF2B5EF4-FFF2-40B4-BE49-F238E27FC236}">
+                <a16:creationId xmlns:a16="http://schemas.microsoft.com/office/drawing/2014/main" id="{495EC3FC-E733-368B-FEE0-93C853138D2E}"/>
+              </a:ext>
+            </a:extLst>
+          </p:cNvPr>
+          <p:cNvPicPr>
+            <a:picLocks noChangeAspect="1"/>
+          </p:cNvPicPr>
+          <p:nvPr/>
+        </p:nvPicPr>
+        <p:blipFill>
+          <a:blip r:embed="rId9"/>
+          <a:stretch>
+            <a:fillRect/>
+          </a:stretch>
+        </p:blipFill>
+        <p:spPr>
+          <a:xfrm>
+            <a:off x="7118530" y="3563741"/>
+            <a:ext cx="1870765" cy="1719897"/>
+          </a:xfrm>
+          <a:prstGeom prst="rect">
+            <a:avLst/>
+          </a:prstGeom>
+        </p:spPr>
+      </p:pic>
     </p:spTree>
     <p:extLst>
       <p:ext uri="{BB962C8B-B14F-4D97-AF65-F5344CB8AC3E}">
@@ -6954,7 +7162,7 @@
         </p:blipFill>
         <p:spPr>
           <a:xfrm>
-            <a:off x="-8965" y="-27654"/>
+            <a:off x="0" y="-42402"/>
             <a:ext cx="12192000" cy="6857999"/>
           </a:xfrm>
           <a:prstGeom prst="rect">
@@ -7263,10 +7471,10 @@
       </p:sp>
       <p:sp>
         <p:nvSpPr>
-          <p:cNvPr id="2" name="CuadroTexto 1">
+          <p:cNvPr id="6" name="CuadroTexto 5">
             <a:extLst>
               <a:ext uri="{FF2B5EF4-FFF2-40B4-BE49-F238E27FC236}">
-                <a16:creationId xmlns:a16="http://schemas.microsoft.com/office/drawing/2014/main" id="{7BE8A922-697E-68B9-B55C-B5778806A121}"/>
+                <a16:creationId xmlns:a16="http://schemas.microsoft.com/office/drawing/2014/main" id="{C62A22A0-2250-EF23-B800-FEB9E38ACE83}"/>
               </a:ext>
             </a:extLst>
           </p:cNvPr>
@@ -7275,8 +7483,8 @@
         </p:nvSpPr>
         <p:spPr>
           <a:xfrm>
-            <a:off x="1398494" y="2565605"/>
-            <a:ext cx="4191000" cy="375552"/>
+            <a:off x="8820784" y="2780233"/>
+            <a:ext cx="1585722" cy="375552"/>
           </a:xfrm>
           <a:prstGeom prst="rect">
             <a:avLst/>
@@ -7304,54 +7512,6 @@
                 <a:ea typeface="Calibri" panose="020F0502020204030204" pitchFamily="34" charset="0"/>
                 <a:cs typeface="Times New Roman" panose="02020603050405020304" pitchFamily="18" charset="0"/>
               </a:rPr>
-              <a:t>Instalación</a:t>
-            </a:r>
-          </a:p>
-        </p:txBody>
-      </p:sp>
-      <p:sp>
-        <p:nvSpPr>
-          <p:cNvPr id="6" name="CuadroTexto 5">
-            <a:extLst>
-              <a:ext uri="{FF2B5EF4-FFF2-40B4-BE49-F238E27FC236}">
-                <a16:creationId xmlns:a16="http://schemas.microsoft.com/office/drawing/2014/main" id="{C62A22A0-2250-EF23-B800-FEB9E38ACE83}"/>
-              </a:ext>
-            </a:extLst>
-          </p:cNvPr>
-          <p:cNvSpPr txBox="1"/>
-          <p:nvPr/>
-        </p:nvSpPr>
-        <p:spPr>
-          <a:xfrm>
-            <a:off x="7930259" y="2631446"/>
-            <a:ext cx="2286000" cy="375552"/>
-          </a:xfrm>
-          <a:prstGeom prst="rect">
-            <a:avLst/>
-          </a:prstGeom>
-          <a:noFill/>
-        </p:spPr>
-        <p:txBody>
-          <a:bodyPr wrap="square" rtlCol="0">
-            <a:spAutoFit/>
-          </a:bodyPr>
-          <a:lstStyle/>
-          <a:p>
-            <a:pPr marL="457200" lvl="1">
-              <a:lnSpc>
-                <a:spcPct val="107000"/>
-              </a:lnSpc>
-              <a:spcAft>
-                <a:spcPts val="800"/>
-              </a:spcAft>
-            </a:pPr>
-            <a:r>
-              <a:rPr lang="es-CO" sz="1800" kern="100" dirty="0">
-                <a:effectLst/>
-                <a:latin typeface="Calibri" panose="020F0502020204030204" pitchFamily="34" charset="0"/>
-                <a:ea typeface="Calibri" panose="020F0502020204030204" pitchFamily="34" charset="0"/>
-                <a:cs typeface="Times New Roman" panose="02020603050405020304" pitchFamily="18" charset="0"/>
-              </a:rPr>
               <a:t>Técnico</a:t>
             </a:r>
           </a:p>
@@ -7371,7 +7531,7 @@
         </p:nvSpPr>
         <p:spPr>
           <a:xfrm>
-            <a:off x="4876800" y="4572000"/>
+            <a:off x="4876800" y="2814646"/>
             <a:ext cx="1734721" cy="375552"/>
           </a:xfrm>
           <a:prstGeom prst="rect">
@@ -7405,6 +7565,147 @@
           </a:p>
         </p:txBody>
       </p:sp>
+      <p:pic>
+        <p:nvPicPr>
+          <p:cNvPr id="4" name="Imagen 3">
+            <a:hlinkClick r:id="rId6"/>
+            <a:extLst>
+              <a:ext uri="{FF2B5EF4-FFF2-40B4-BE49-F238E27FC236}">
+                <a16:creationId xmlns:a16="http://schemas.microsoft.com/office/drawing/2014/main" id="{2A7DC9DF-E954-47E3-F7B1-F6302D1E3AD7}"/>
+              </a:ext>
+            </a:extLst>
+          </p:cNvPr>
+          <p:cNvPicPr>
+            <a:picLocks noChangeAspect="1"/>
+          </p:cNvPicPr>
+          <p:nvPr/>
+        </p:nvPicPr>
+        <p:blipFill>
+          <a:blip r:embed="rId7"/>
+          <a:stretch>
+            <a:fillRect/>
+          </a:stretch>
+        </p:blipFill>
+        <p:spPr>
+          <a:xfrm>
+            <a:off x="1039939" y="3293395"/>
+            <a:ext cx="1870765" cy="1676400"/>
+          </a:xfrm>
+          <a:prstGeom prst="rect">
+            <a:avLst/>
+          </a:prstGeom>
+        </p:spPr>
+      </p:pic>
+      <p:sp>
+        <p:nvSpPr>
+          <p:cNvPr id="8" name="CuadroTexto 7">
+            <a:extLst>
+              <a:ext uri="{FF2B5EF4-FFF2-40B4-BE49-F238E27FC236}">
+                <a16:creationId xmlns:a16="http://schemas.microsoft.com/office/drawing/2014/main" id="{1FC8CA62-C5FB-4A3B-1381-71A31701D5BD}"/>
+              </a:ext>
+            </a:extLst>
+          </p:cNvPr>
+          <p:cNvSpPr txBox="1"/>
+          <p:nvPr/>
+        </p:nvSpPr>
+        <p:spPr>
+          <a:xfrm>
+            <a:off x="1219200" y="2814646"/>
+            <a:ext cx="2438400" cy="375552"/>
+          </a:xfrm>
+          <a:prstGeom prst="rect">
+            <a:avLst/>
+          </a:prstGeom>
+          <a:noFill/>
+        </p:spPr>
+        <p:txBody>
+          <a:bodyPr wrap="square" rtlCol="0">
+            <a:spAutoFit/>
+          </a:bodyPr>
+          <a:lstStyle/>
+          <a:p>
+            <a:pPr marL="457200" lvl="1">
+              <a:lnSpc>
+                <a:spcPct val="107000"/>
+              </a:lnSpc>
+              <a:spcAft>
+                <a:spcPts val="800"/>
+              </a:spcAft>
+            </a:pPr>
+            <a:r>
+              <a:rPr lang="es-CO" sz="1800" kern="100" dirty="0">
+                <a:effectLst/>
+                <a:latin typeface="Calibri" panose="020F0502020204030204" pitchFamily="34" charset="0"/>
+                <a:ea typeface="Calibri" panose="020F0502020204030204" pitchFamily="34" charset="0"/>
+                <a:cs typeface="Times New Roman" panose="02020603050405020304" pitchFamily="18" charset="0"/>
+              </a:rPr>
+              <a:t>instalación</a:t>
+            </a:r>
+          </a:p>
+        </p:txBody>
+      </p:sp>
+      <p:pic>
+        <p:nvPicPr>
+          <p:cNvPr id="10" name="Imagen 9">
+            <a:hlinkClick r:id="rId8"/>
+            <a:extLst>
+              <a:ext uri="{FF2B5EF4-FFF2-40B4-BE49-F238E27FC236}">
+                <a16:creationId xmlns:a16="http://schemas.microsoft.com/office/drawing/2014/main" id="{8EA14140-C230-5DC3-44FF-C75535C97DCC}"/>
+              </a:ext>
+            </a:extLst>
+          </p:cNvPr>
+          <p:cNvPicPr>
+            <a:picLocks noChangeAspect="1"/>
+          </p:cNvPicPr>
+          <p:nvPr/>
+        </p:nvPicPr>
+        <p:blipFill>
+          <a:blip r:embed="rId9"/>
+          <a:stretch>
+            <a:fillRect/>
+          </a:stretch>
+        </p:blipFill>
+        <p:spPr>
+          <a:xfrm>
+            <a:off x="4876800" y="3293395"/>
+            <a:ext cx="1870765" cy="2272792"/>
+          </a:xfrm>
+          <a:prstGeom prst="rect">
+            <a:avLst/>
+          </a:prstGeom>
+        </p:spPr>
+      </p:pic>
+      <p:pic>
+        <p:nvPicPr>
+          <p:cNvPr id="12" name="Imagen 11">
+            <a:hlinkClick r:id="rId10"/>
+            <a:extLst>
+              <a:ext uri="{FF2B5EF4-FFF2-40B4-BE49-F238E27FC236}">
+                <a16:creationId xmlns:a16="http://schemas.microsoft.com/office/drawing/2014/main" id="{1CFE5964-88B6-C2E1-5F45-649DE3724DBE}"/>
+              </a:ext>
+            </a:extLst>
+          </p:cNvPr>
+          <p:cNvPicPr>
+            <a:picLocks noChangeAspect="1"/>
+          </p:cNvPicPr>
+          <p:nvPr/>
+        </p:nvPicPr>
+        <p:blipFill>
+          <a:blip r:embed="rId11"/>
+          <a:stretch>
+            <a:fillRect/>
+          </a:stretch>
+        </p:blipFill>
+        <p:spPr>
+          <a:xfrm>
+            <a:off x="8580598" y="3293395"/>
+            <a:ext cx="1870765" cy="2106881"/>
+          </a:xfrm>
+          <a:prstGeom prst="rect">
+            <a:avLst/>
+          </a:prstGeom>
+        </p:spPr>
+      </p:pic>
     </p:spTree>
     <p:extLst>
       <p:ext uri="{BB962C8B-B14F-4D97-AF65-F5344CB8AC3E}">

</xml_diff>

<commit_message>
Se actualiza presentacion final del proyecto
</commit_message>
<xml_diff>
--- a/front/public/Documentacion/Trimestre_5/Presentacion Proyecto/Presentación del Proyecto Mystical cut final (1).pptx
+++ b/front/public/Documentacion/Trimestre_5/Presentacion Proyecto/Presentación del Proyecto Mystical cut final (1).pptx
@@ -134,7 +134,7 @@
           <a:p>
             <a:fld id="{F3A95CE1-84B0-4F6B-9753-6804FA03EAE1}" type="datetimeFigureOut">
               <a:rPr lang="es-CO" smtClean="0"/>
-              <a:t>7/07/2025</a:t>
+              <a:t>8/07/2025</a:t>
             </a:fld>
             <a:endParaRPr lang="es-CO"/>
           </a:p>
@@ -745,7 +745,7 @@
           <a:p>
             <a:fld id="{09ACC33D-2F5D-410B-8451-686160647FEB}" type="datetime1">
               <a:rPr lang="en-US" smtClean="0"/>
-              <a:t>7/7/2025</a:t>
+              <a:t>7/8/2025</a:t>
             </a:fld>
             <a:endParaRPr lang="en-US"/>
           </a:p>
@@ -922,7 +922,7 @@
           <a:p>
             <a:fld id="{161FD5B6-F778-46C6-B9D5-439CFB49676D}" type="datetime1">
               <a:rPr lang="en-US" smtClean="0"/>
-              <a:t>7/7/2025</a:t>
+              <a:t>7/8/2025</a:t>
             </a:fld>
             <a:endParaRPr lang="en-US"/>
           </a:p>
@@ -1166,7 +1166,7 @@
           <a:p>
             <a:fld id="{44D58D29-4766-4272-B394-7B2D94CA84EC}" type="datetime1">
               <a:rPr lang="en-US" smtClean="0"/>
-              <a:t>7/7/2025</a:t>
+              <a:t>7/8/2025</a:t>
             </a:fld>
             <a:endParaRPr lang="en-US"/>
           </a:p>
@@ -1344,7 +1344,7 @@
           <a:p>
             <a:fld id="{4379EB59-2D53-4D52-A615-1216927C25FE}" type="datetime1">
               <a:rPr lang="en-US" smtClean="0"/>
-              <a:t>7/7/2025</a:t>
+              <a:t>7/8/2025</a:t>
             </a:fld>
             <a:endParaRPr lang="en-US"/>
           </a:p>
@@ -1463,7 +1463,7 @@
           <a:p>
             <a:fld id="{DB0DE0B6-7121-4FF5-A7EB-386AE14FBCEE}" type="datetime1">
               <a:rPr lang="en-US" smtClean="0"/>
-              <a:t>7/7/2025</a:t>
+              <a:t>7/8/2025</a:t>
             </a:fld>
             <a:endParaRPr lang="en-US"/>
           </a:p>
@@ -1688,7 +1688,7 @@
           <a:p>
             <a:fld id="{D099D791-5A16-4B64-92F1-CC236E3EC932}" type="datetime1">
               <a:rPr lang="en-US" smtClean="0"/>
-              <a:t>7/7/2025</a:t>
+              <a:t>7/8/2025</a:t>
             </a:fld>
             <a:endParaRPr lang="en-US"/>
           </a:p>
@@ -6974,7 +6974,7 @@
         </p:nvSpPr>
         <p:spPr>
           <a:xfrm>
-            <a:off x="6858000" y="2800406"/>
+            <a:off x="7846295" y="2727629"/>
             <a:ext cx="2286000" cy="375552"/>
           </a:xfrm>
           <a:prstGeom prst="rect">
@@ -7022,8 +7022,8 @@
         </p:nvSpPr>
         <p:spPr>
           <a:xfrm>
-            <a:off x="1828800" y="2780648"/>
-            <a:ext cx="3797580" cy="375552"/>
+            <a:off x="914400" y="2710423"/>
+            <a:ext cx="2667000" cy="375552"/>
           </a:xfrm>
           <a:prstGeom prst="rect">
             <a:avLst/>
@@ -7051,7 +7051,7 @@
                 <a:ea typeface="Calibri" panose="020F0502020204030204" pitchFamily="34" charset="0"/>
                 <a:cs typeface="Times New Roman" panose="02020603050405020304" pitchFamily="18" charset="0"/>
               </a:rPr>
-              <a:t>Plan de Migración y Capacitación</a:t>
+              <a:t>Plan de Capacitación</a:t>
             </a:r>
           </a:p>
         </p:txBody>
@@ -7079,7 +7079,7 @@
         </p:blipFill>
         <p:spPr>
           <a:xfrm>
-            <a:off x="3124200" y="3392129"/>
+            <a:off x="1447800" y="3222973"/>
             <a:ext cx="1795681" cy="2063123"/>
           </a:xfrm>
           <a:prstGeom prst="rect">
@@ -7110,8 +7110,101 @@
         </p:blipFill>
         <p:spPr>
           <a:xfrm>
-            <a:off x="7118530" y="3563741"/>
+            <a:off x="8053912" y="3429000"/>
             <a:ext cx="1870765" cy="1719897"/>
+          </a:xfrm>
+          <a:prstGeom prst="rect">
+            <a:avLst/>
+          </a:prstGeom>
+        </p:spPr>
+      </p:pic>
+      <p:sp>
+        <p:nvSpPr>
+          <p:cNvPr id="2" name="CuadroTexto 1">
+            <a:extLst>
+              <a:ext uri="{FF2B5EF4-FFF2-40B4-BE49-F238E27FC236}">
+                <a16:creationId xmlns:a16="http://schemas.microsoft.com/office/drawing/2014/main" id="{CB672BB8-C389-146D-3F13-8C129D9B6C1B}"/>
+              </a:ext>
+            </a:extLst>
+          </p:cNvPr>
+          <p:cNvSpPr txBox="1"/>
+          <p:nvPr/>
+        </p:nvSpPr>
+        <p:spPr>
+          <a:xfrm>
+            <a:off x="4505632" y="2678468"/>
+            <a:ext cx="2428568" cy="375552"/>
+          </a:xfrm>
+          <a:prstGeom prst="rect">
+            <a:avLst/>
+          </a:prstGeom>
+          <a:noFill/>
+        </p:spPr>
+        <p:txBody>
+          <a:bodyPr wrap="square" rtlCol="0">
+            <a:spAutoFit/>
+          </a:bodyPr>
+          <a:lstStyle/>
+          <a:p>
+            <a:pPr marL="457200" lvl="1">
+              <a:lnSpc>
+                <a:spcPct val="107000"/>
+              </a:lnSpc>
+              <a:spcAft>
+                <a:spcPts val="800"/>
+              </a:spcAft>
+            </a:pPr>
+            <a:r>
+              <a:rPr lang="es-CO" sz="1800" kern="100" dirty="0">
+                <a:effectLst/>
+                <a:latin typeface="Calibri" panose="020F0502020204030204" pitchFamily="34" charset="0"/>
+                <a:ea typeface="Calibri" panose="020F0502020204030204" pitchFamily="34" charset="0"/>
+                <a:cs typeface="Times New Roman" panose="02020603050405020304" pitchFamily="18" charset="0"/>
+              </a:rPr>
+              <a:t>Plan de </a:t>
+            </a:r>
+            <a:r>
+              <a:rPr lang="es-CO" kern="100" dirty="0">
+                <a:latin typeface="Calibri" panose="020F0502020204030204" pitchFamily="34" charset="0"/>
+                <a:ea typeface="Calibri" panose="020F0502020204030204" pitchFamily="34" charset="0"/>
+                <a:cs typeface="Times New Roman" panose="02020603050405020304" pitchFamily="18" charset="0"/>
+              </a:rPr>
+              <a:t>Migración</a:t>
+            </a:r>
+            <a:endParaRPr lang="es-CO" sz="1800" kern="100" dirty="0">
+              <a:effectLst/>
+              <a:latin typeface="Calibri" panose="020F0502020204030204" pitchFamily="34" charset="0"/>
+              <a:ea typeface="Calibri" panose="020F0502020204030204" pitchFamily="34" charset="0"/>
+              <a:cs typeface="Times New Roman" panose="02020603050405020304" pitchFamily="18" charset="0"/>
+            </a:endParaRPr>
+          </a:p>
+        </p:txBody>
+      </p:sp>
+      <p:pic>
+        <p:nvPicPr>
+          <p:cNvPr id="8" name="Imagen 7">
+            <a:hlinkClick r:id="rId10"/>
+            <a:extLst>
+              <a:ext uri="{FF2B5EF4-FFF2-40B4-BE49-F238E27FC236}">
+                <a16:creationId xmlns:a16="http://schemas.microsoft.com/office/drawing/2014/main" id="{FD775483-3263-719A-A442-46F8D817FCC9}"/>
+              </a:ext>
+            </a:extLst>
+          </p:cNvPr>
+          <p:cNvPicPr>
+            <a:picLocks noChangeAspect="1"/>
+          </p:cNvPicPr>
+          <p:nvPr/>
+        </p:nvPicPr>
+        <p:blipFill>
+          <a:blip r:embed="rId11"/>
+          <a:stretch>
+            <a:fillRect/>
+          </a:stretch>
+        </p:blipFill>
+        <p:spPr>
+          <a:xfrm>
+            <a:off x="4898580" y="3380720"/>
+            <a:ext cx="1795681" cy="1957230"/>
           </a:xfrm>
           <a:prstGeom prst="rect">
             <a:avLst/>
@@ -9939,7 +10032,7 @@
                 <a:ea typeface="Calibri" panose="020F0502020204030204" pitchFamily="34" charset="0"/>
                 <a:cs typeface="Times New Roman" panose="02020603050405020304" pitchFamily="18" charset="0"/>
               </a:rPr>
-              <a:t>Codificación del proyecto al 100%</a:t>
+              <a:t>Codificación del proyecto </a:t>
             </a:r>
             <a:endParaRPr lang="es-CO" sz="1100" kern="100" dirty="0">
               <a:effectLst/>

</xml_diff>